<commit_message>
add gitignore for temp office files
</commit_message>
<xml_diff>
--- a/resources/documentation/Abschlusspraesentation.pptx
+++ b/resources/documentation/Abschlusspraesentation.pptx
@@ -5,10 +5,10 @@
     <p:sldMasterId id="2147483660" r:id="rId1"/>
   </p:sldMasterIdLst>
   <p:notesMasterIdLst>
-    <p:notesMasterId r:id="rId13"/>
+    <p:notesMasterId r:id="rId14"/>
   </p:notesMasterIdLst>
   <p:handoutMasterIdLst>
-    <p:handoutMasterId r:id="rId14"/>
+    <p:handoutMasterId r:id="rId15"/>
   </p:handoutMasterIdLst>
   <p:sldIdLst>
     <p:sldId id="256" r:id="rId2"/>
@@ -20,8 +20,9 @@
     <p:sldId id="269" r:id="rId8"/>
     <p:sldId id="273" r:id="rId9"/>
     <p:sldId id="260" r:id="rId10"/>
-    <p:sldId id="263" r:id="rId11"/>
-    <p:sldId id="265" r:id="rId12"/>
+    <p:sldId id="274" r:id="rId11"/>
+    <p:sldId id="263" r:id="rId12"/>
+    <p:sldId id="265" r:id="rId13"/>
   </p:sldIdLst>
   <p:sldSz cx="12192000" cy="6858000"/>
   <p:notesSz cx="6858000" cy="9144000"/>
@@ -139,204 +140,12 @@
 
 <file path=ppt/comments/comment1.xml><?xml version="1.0" encoding="utf-8"?>
 <p:cmLst xmlns:a="http://schemas.openxmlformats.org/drawingml/2006/main" xmlns:r="http://schemas.openxmlformats.org/officeDocument/2006/relationships" xmlns:p="http://schemas.openxmlformats.org/presentationml/2006/main">
-  <p:cm authorId="2" dt="2022-01-12T18:29:11.849" idx="1">
-    <p:pos x="10" y="10"/>
-    <p:text/>
-    <p:extLst>
-      <p:ext uri="{C676402C-5697-4E1C-873F-D02D1690AC5C}">
-        <p15:threadingInfo xmlns:p15="http://schemas.microsoft.com/office/powerpoint/2012/main" timeZoneBias="-60"/>
-      </p:ext>
-    </p:extLst>
-  </p:cm>
-  <p:cm authorId="2" dt="2022-01-12T19:10:26.700" idx="3">
-    <p:pos x="10" y="146"/>
-    <p:text>Jonas</p:text>
-    <p:extLst>
-      <p:ext uri="{C676402C-5697-4E1C-873F-D02D1690AC5C}">
-        <p15:threadingInfo xmlns:p15="http://schemas.microsoft.com/office/powerpoint/2012/main" timeZoneBias="-60">
-          <p15:parentCm authorId="2" idx="1"/>
-        </p15:threadingInfo>
-      </p:ext>
-    </p:extLst>
-  </p:cm>
-</p:cmLst>
-</file>
-
-<file path=ppt/comments/comment10.xml><?xml version="1.0" encoding="utf-8"?>
-<p:cmLst xmlns:a="http://schemas.openxmlformats.org/drawingml/2006/main" xmlns:r="http://schemas.openxmlformats.org/officeDocument/2006/relationships" xmlns:p="http://schemas.openxmlformats.org/presentationml/2006/main">
   <p:cm authorId="2" dt="2022-01-12T19:14:57.160" idx="17">
     <p:pos x="10" y="10"/>
     <p:text>Jonas</p:text>
     <p:extLst>
       <p:ext uri="{C676402C-5697-4E1C-873F-D02D1690AC5C}">
         <p15:threadingInfo xmlns:p15="http://schemas.microsoft.com/office/powerpoint/2012/main" timeZoneBias="-60"/>
-      </p:ext>
-    </p:extLst>
-  </p:cm>
-</p:cmLst>
-</file>
-
-<file path=ppt/comments/comment2.xml><?xml version="1.0" encoding="utf-8"?>
-<p:cmLst xmlns:a="http://schemas.openxmlformats.org/drawingml/2006/main" xmlns:r="http://schemas.openxmlformats.org/officeDocument/2006/relationships" xmlns:p="http://schemas.openxmlformats.org/presentationml/2006/main">
-  <p:cm authorId="2" dt="2022-01-12T19:10:07.983" idx="4">
-    <p:pos x="10" y="10"/>
-    <p:text/>
-    <p:extLst>
-      <p:ext uri="{C676402C-5697-4E1C-873F-D02D1690AC5C}">
-        <p15:threadingInfo xmlns:p15="http://schemas.microsoft.com/office/powerpoint/2012/main" timeZoneBias="-60"/>
-      </p:ext>
-    </p:extLst>
-  </p:cm>
-  <p:cm authorId="2" dt="2022-01-12T19:10:33.212" idx="5">
-    <p:pos x="10" y="146"/>
-    <p:text>Jonas</p:text>
-    <p:extLst>
-      <p:ext uri="{C676402C-5697-4E1C-873F-D02D1690AC5C}">
-        <p15:threadingInfo xmlns:p15="http://schemas.microsoft.com/office/powerpoint/2012/main" timeZoneBias="-60">
-          <p15:parentCm authorId="2" idx="4"/>
-        </p15:threadingInfo>
-      </p:ext>
-    </p:extLst>
-  </p:cm>
-</p:cmLst>
-</file>
-
-<file path=ppt/comments/comment3.xml><?xml version="1.0" encoding="utf-8"?>
-<p:cmLst xmlns:a="http://schemas.openxmlformats.org/drawingml/2006/main" xmlns:r="http://schemas.openxmlformats.org/officeDocument/2006/relationships" xmlns:p="http://schemas.openxmlformats.org/presentationml/2006/main">
-  <p:cm authorId="2" dt="2022-01-12T19:10:48.122" idx="6">
-    <p:pos x="10" y="10"/>
-    <p:text>Marco</p:text>
-    <p:extLst>
-      <p:ext uri="{C676402C-5697-4E1C-873F-D02D1690AC5C}">
-        <p15:threadingInfo xmlns:p15="http://schemas.microsoft.com/office/powerpoint/2012/main" timeZoneBias="-60"/>
-      </p:ext>
-    </p:extLst>
-  </p:cm>
-</p:cmLst>
-</file>
-
-<file path=ppt/comments/comment4.xml><?xml version="1.0" encoding="utf-8"?>
-<p:cmLst xmlns:a="http://schemas.openxmlformats.org/drawingml/2006/main" xmlns:r="http://schemas.openxmlformats.org/officeDocument/2006/relationships" xmlns:p="http://schemas.openxmlformats.org/presentationml/2006/main">
-  <p:cm authorId="2" dt="2022-01-12T19:16:30.787" idx="18">
-    <p:pos x="10" y="10"/>
-    <p:text>Marco</p:text>
-    <p:extLst>
-      <p:ext uri="{C676402C-5697-4E1C-873F-D02D1690AC5C}">
-        <p15:threadingInfo xmlns:p15="http://schemas.microsoft.com/office/powerpoint/2012/main" timeZoneBias="-60"/>
-      </p:ext>
-    </p:extLst>
-  </p:cm>
-</p:cmLst>
-</file>
-
-<file path=ppt/comments/comment5.xml><?xml version="1.0" encoding="utf-8"?>
-<p:cmLst xmlns:a="http://schemas.openxmlformats.org/drawingml/2006/main" xmlns:r="http://schemas.openxmlformats.org/officeDocument/2006/relationships" xmlns:p="http://schemas.openxmlformats.org/presentationml/2006/main">
-  <p:cm authorId="2" dt="2022-01-12T19:11:13.083" idx="8">
-    <p:pos x="10" y="10"/>
-    <p:text>Jonas</p:text>
-    <p:extLst>
-      <p:ext uri="{C676402C-5697-4E1C-873F-D02D1690AC5C}">
-        <p15:threadingInfo xmlns:p15="http://schemas.microsoft.com/office/powerpoint/2012/main" timeZoneBias="-60"/>
-      </p:ext>
-    </p:extLst>
-  </p:cm>
-</p:cmLst>
-</file>
-
-<file path=ppt/comments/comment6.xml><?xml version="1.0" encoding="utf-8"?>
-<p:cmLst xmlns:a="http://schemas.openxmlformats.org/drawingml/2006/main" xmlns:r="http://schemas.openxmlformats.org/officeDocument/2006/relationships" xmlns:p="http://schemas.openxmlformats.org/presentationml/2006/main">
-  <p:cm authorId="2" dt="2022-01-12T19:11:45.439" idx="9">
-    <p:pos x="10" y="10"/>
-    <p:text>Marco</p:text>
-    <p:extLst>
-      <p:ext uri="{C676402C-5697-4E1C-873F-D02D1690AC5C}">
-        <p15:threadingInfo xmlns:p15="http://schemas.microsoft.com/office/powerpoint/2012/main" timeZoneBias="-60"/>
-      </p:ext>
-    </p:extLst>
-  </p:cm>
-</p:cmLst>
-</file>
-
-<file path=ppt/comments/comment7.xml><?xml version="1.0" encoding="utf-8"?>
-<p:cmLst xmlns:a="http://schemas.openxmlformats.org/drawingml/2006/main" xmlns:r="http://schemas.openxmlformats.org/officeDocument/2006/relationships" xmlns:p="http://schemas.openxmlformats.org/presentationml/2006/main">
-  <p:cm authorId="2" dt="2022-01-12T19:12:04.139" idx="10">
-    <p:pos x="10" y="10"/>
-    <p:text>Jonas</p:text>
-    <p:extLst>
-      <p:ext uri="{C676402C-5697-4E1C-873F-D02D1690AC5C}">
-        <p15:threadingInfo xmlns:p15="http://schemas.microsoft.com/office/powerpoint/2012/main" timeZoneBias="-60"/>
-      </p:ext>
-    </p:extLst>
-  </p:cm>
-</p:cmLst>
-</file>
-
-<file path=ppt/comments/comment8.xml><?xml version="1.0" encoding="utf-8"?>
-<p:cmLst xmlns:a="http://schemas.openxmlformats.org/drawingml/2006/main" xmlns:r="http://schemas.openxmlformats.org/officeDocument/2006/relationships" xmlns:p="http://schemas.openxmlformats.org/presentationml/2006/main">
-  <p:cm authorId="2" dt="2022-01-12T19:12:09.801" idx="11">
-    <p:pos x="10" y="10"/>
-    <p:text>Jonas</p:text>
-    <p:extLst>
-      <p:ext uri="{C676402C-5697-4E1C-873F-D02D1690AC5C}">
-        <p15:threadingInfo xmlns:p15="http://schemas.microsoft.com/office/powerpoint/2012/main" timeZoneBias="-60"/>
-      </p:ext>
-    </p:extLst>
-  </p:cm>
-</p:cmLst>
-</file>
-
-<file path=ppt/comments/comment9.xml><?xml version="1.0" encoding="utf-8"?>
-<p:cmLst xmlns:a="http://schemas.openxmlformats.org/drawingml/2006/main" xmlns:r="http://schemas.openxmlformats.org/officeDocument/2006/relationships" xmlns:p="http://schemas.openxmlformats.org/presentationml/2006/main">
-  <p:cm authorId="2" dt="2022-01-12T19:12:39.248" idx="12">
-    <p:pos x="10" y="10"/>
-    <p:text>1. Marco</p:text>
-    <p:extLst>
-      <p:ext uri="{C676402C-5697-4E1C-873F-D02D1690AC5C}">
-        <p15:threadingInfo xmlns:p15="http://schemas.microsoft.com/office/powerpoint/2012/main" timeZoneBias="-60"/>
-      </p:ext>
-    </p:extLst>
-  </p:cm>
-  <p:cm authorId="2" dt="2022-01-12T19:13:04.955" idx="13">
-    <p:pos x="10" y="146"/>
-    <p:text>2. Jonas</p:text>
-    <p:extLst>
-      <p:ext uri="{C676402C-5697-4E1C-873F-D02D1690AC5C}">
-        <p15:threadingInfo xmlns:p15="http://schemas.microsoft.com/office/powerpoint/2012/main" timeZoneBias="-60">
-          <p15:parentCm authorId="2" idx="12"/>
-        </p15:threadingInfo>
-      </p:ext>
-    </p:extLst>
-  </p:cm>
-  <p:cm authorId="2" dt="2022-01-12T19:13:18.949" idx="14">
-    <p:pos x="10" y="282"/>
-    <p:text>3. Marco</p:text>
-    <p:extLst>
-      <p:ext uri="{C676402C-5697-4E1C-873F-D02D1690AC5C}">
-        <p15:threadingInfo xmlns:p15="http://schemas.microsoft.com/office/powerpoint/2012/main" timeZoneBias="-60">
-          <p15:parentCm authorId="2" idx="12"/>
-        </p15:threadingInfo>
-      </p:ext>
-    </p:extLst>
-  </p:cm>
-  <p:cm authorId="2" dt="2022-01-12T19:14:32.551" idx="15">
-    <p:pos x="10" y="418"/>
-    <p:text>4. Marco</p:text>
-    <p:extLst>
-      <p:ext uri="{C676402C-5697-4E1C-873F-D02D1690AC5C}">
-        <p15:threadingInfo xmlns:p15="http://schemas.microsoft.com/office/powerpoint/2012/main" timeZoneBias="-60">
-          <p15:parentCm authorId="2" idx="12"/>
-        </p15:threadingInfo>
-      </p:ext>
-    </p:extLst>
-  </p:cm>
-  <p:cm authorId="2" dt="2022-01-12T19:14:42.977" idx="16">
-    <p:pos x="10" y="554"/>
-    <p:text>5. Jonas</p:text>
-    <p:extLst>
-      <p:ext uri="{C676402C-5697-4E1C-873F-D02D1690AC5C}">
-        <p15:threadingInfo xmlns:p15="http://schemas.microsoft.com/office/powerpoint/2012/main" timeZoneBias="-60">
-          <p15:parentCm authorId="2" idx="12"/>
-        </p15:threadingInfo>
       </p:ext>
     </p:extLst>
   </p:cm>
@@ -3793,7 +3602,7 @@
           <a:p>
             <a:fld id="{65A80223-0394-4653-850A-5CFB486BDE83}" type="datetime1">
               <a:rPr lang="de-DE" smtClean="0"/>
-              <a:t>12.01.2022</a:t>
+              <a:t>16.01.2022</a:t>
             </a:fld>
             <a:endParaRPr lang="de-DE" dirty="0"/>
           </a:p>
@@ -3971,7 +3780,7 @@
             <a:fld id="{AFB9EE13-CF4B-4779-BA20-982008386F3C}" type="datetime1">
               <a:rPr lang="de-DE" smtClean="0"/>
               <a:pPr/>
-              <a:t>12.01.2022</a:t>
+              <a:t>16.01.2022</a:t>
             </a:fld>
             <a:endParaRPr lang="de-DE" dirty="0"/>
           </a:p>
@@ -4282,7 +4091,10 @@
           <a:bodyPr/>
           <a:lstStyle/>
           <a:p>
-            <a:endParaRPr lang="de-DE" dirty="0"/>
+            <a:r>
+              <a:rPr lang="de-DE" dirty="0"/>
+              <a:t>Jonas</a:t>
+            </a:r>
           </a:p>
         </p:txBody>
       </p:sp>
@@ -4313,6 +4125,174 @@
     <p:extLst>
       <p:ext uri="{BB962C8B-B14F-4D97-AF65-F5344CB8AC3E}">
         <p14:creationId xmlns:p14="http://schemas.microsoft.com/office/powerpoint/2010/main" val="12191073"/>
+      </p:ext>
+    </p:extLst>
+  </p:cSld>
+  <p:clrMapOvr>
+    <a:masterClrMapping/>
+  </p:clrMapOvr>
+</p:notes>
+</file>
+
+<file path=ppt/notesSlides/notesSlide10.xml><?xml version="1.0" encoding="utf-8"?>
+<p:notes xmlns:a="http://schemas.openxmlformats.org/drawingml/2006/main" xmlns:r="http://schemas.openxmlformats.org/officeDocument/2006/relationships" xmlns:p="http://schemas.openxmlformats.org/presentationml/2006/main">
+  <p:cSld>
+    <p:spTree>
+      <p:nvGrpSpPr>
+        <p:cNvPr id="1" name=""/>
+        <p:cNvGrpSpPr/>
+        <p:nvPr/>
+      </p:nvGrpSpPr>
+      <p:grpSpPr>
+        <a:xfrm>
+          <a:off x="0" y="0"/>
+          <a:ext cx="0" cy="0"/>
+          <a:chOff x="0" y="0"/>
+          <a:chExt cx="0" cy="0"/>
+        </a:xfrm>
+      </p:grpSpPr>
+      <p:sp>
+        <p:nvSpPr>
+          <p:cNvPr id="2" name="Folienbildplatzhalter 1"/>
+          <p:cNvSpPr>
+            <a:spLocks noGrp="1" noRot="1" noChangeAspect="1"/>
+          </p:cNvSpPr>
+          <p:nvPr>
+            <p:ph type="sldImg"/>
+          </p:nvPr>
+        </p:nvSpPr>
+        <p:spPr/>
+      </p:sp>
+      <p:sp>
+        <p:nvSpPr>
+          <p:cNvPr id="3" name="Notizenplatzhalter 2"/>
+          <p:cNvSpPr>
+            <a:spLocks noGrp="1"/>
+          </p:cNvSpPr>
+          <p:nvPr>
+            <p:ph type="body" idx="1"/>
+          </p:nvPr>
+        </p:nvSpPr>
+        <p:spPr/>
+        <p:txBody>
+          <a:bodyPr/>
+          <a:lstStyle/>
+          <a:p>
+            <a:endParaRPr lang="de-DE"/>
+          </a:p>
+        </p:txBody>
+      </p:sp>
+      <p:sp>
+        <p:nvSpPr>
+          <p:cNvPr id="4" name="Foliennummernplatzhalter 3"/>
+          <p:cNvSpPr>
+            <a:spLocks noGrp="1"/>
+          </p:cNvSpPr>
+          <p:nvPr>
+            <p:ph type="sldNum" sz="quarter" idx="5"/>
+          </p:nvPr>
+        </p:nvSpPr>
+        <p:spPr/>
+        <p:txBody>
+          <a:bodyPr/>
+          <a:lstStyle/>
+          <a:p>
+            <a:fld id="{D4C745B4-E2A0-42CC-9FED-47B6EC2BC2F2}" type="slidenum">
+              <a:rPr lang="de-DE" smtClean="0"/>
+              <a:t>11</a:t>
+            </a:fld>
+            <a:endParaRPr lang="de-DE"/>
+          </a:p>
+        </p:txBody>
+      </p:sp>
+    </p:spTree>
+    <p:extLst>
+      <p:ext uri="{BB962C8B-B14F-4D97-AF65-F5344CB8AC3E}">
+        <p14:creationId xmlns:p14="http://schemas.microsoft.com/office/powerpoint/2010/main" val="2939750654"/>
+      </p:ext>
+    </p:extLst>
+  </p:cSld>
+  <p:clrMapOvr>
+    <a:masterClrMapping/>
+  </p:clrMapOvr>
+</p:notes>
+</file>
+
+<file path=ppt/notesSlides/notesSlide11.xml><?xml version="1.0" encoding="utf-8"?>
+<p:notes xmlns:a="http://schemas.openxmlformats.org/drawingml/2006/main" xmlns:r="http://schemas.openxmlformats.org/officeDocument/2006/relationships" xmlns:p="http://schemas.openxmlformats.org/presentationml/2006/main">
+  <p:cSld>
+    <p:spTree>
+      <p:nvGrpSpPr>
+        <p:cNvPr id="1" name=""/>
+        <p:cNvGrpSpPr/>
+        <p:nvPr/>
+      </p:nvGrpSpPr>
+      <p:grpSpPr>
+        <a:xfrm>
+          <a:off x="0" y="0"/>
+          <a:ext cx="0" cy="0"/>
+          <a:chOff x="0" y="0"/>
+          <a:chExt cx="0" cy="0"/>
+        </a:xfrm>
+      </p:grpSpPr>
+      <p:sp>
+        <p:nvSpPr>
+          <p:cNvPr id="2" name="Folienbildplatzhalter 1"/>
+          <p:cNvSpPr>
+            <a:spLocks noGrp="1" noRot="1" noChangeAspect="1"/>
+          </p:cNvSpPr>
+          <p:nvPr>
+            <p:ph type="sldImg"/>
+          </p:nvPr>
+        </p:nvSpPr>
+        <p:spPr/>
+      </p:sp>
+      <p:sp>
+        <p:nvSpPr>
+          <p:cNvPr id="3" name="Notizenplatzhalter 2"/>
+          <p:cNvSpPr>
+            <a:spLocks noGrp="1"/>
+          </p:cNvSpPr>
+          <p:nvPr>
+            <p:ph type="body" idx="1"/>
+          </p:nvPr>
+        </p:nvSpPr>
+        <p:spPr/>
+        <p:txBody>
+          <a:bodyPr/>
+          <a:lstStyle/>
+          <a:p>
+            <a:endParaRPr lang="de-DE"/>
+          </a:p>
+        </p:txBody>
+      </p:sp>
+      <p:sp>
+        <p:nvSpPr>
+          <p:cNvPr id="4" name="Foliennummernplatzhalter 3"/>
+          <p:cNvSpPr>
+            <a:spLocks noGrp="1"/>
+          </p:cNvSpPr>
+          <p:nvPr>
+            <p:ph type="sldNum" sz="quarter" idx="5"/>
+          </p:nvPr>
+        </p:nvSpPr>
+        <p:spPr/>
+        <p:txBody>
+          <a:bodyPr/>
+          <a:lstStyle/>
+          <a:p>
+            <a:fld id="{D4C745B4-E2A0-42CC-9FED-47B6EC2BC2F2}" type="slidenum">
+              <a:rPr lang="de-DE" smtClean="0"/>
+              <a:t>12</a:t>
+            </a:fld>
+            <a:endParaRPr lang="de-DE"/>
+          </a:p>
+        </p:txBody>
+      </p:sp>
+    </p:spTree>
+    <p:extLst>
+      <p:ext uri="{BB962C8B-B14F-4D97-AF65-F5344CB8AC3E}">
+        <p14:creationId xmlns:p14="http://schemas.microsoft.com/office/powerpoint/2010/main" val="825276934"/>
       </p:ext>
     </p:extLst>
   </p:cSld>
@@ -4366,7 +4346,10 @@
           <a:bodyPr/>
           <a:lstStyle/>
           <a:p>
-            <a:endParaRPr lang="de-DE"/>
+            <a:r>
+              <a:rPr lang="de-CH" dirty="0"/>
+              <a:t>Jonas</a:t>
+            </a:r>
           </a:p>
         </p:txBody>
       </p:sp>
@@ -4386,17 +4369,17 @@
           <a:lstStyle/>
           <a:p>
             <a:fld id="{D4C745B4-E2A0-42CC-9FED-47B6EC2BC2F2}" type="slidenum">
-              <a:rPr lang="de-DE" smtClean="0"/>
-              <a:t>9</a:t>
+              <a:rPr lang="de-DE" noProof="0" smtClean="0"/>
+              <a:t>2</a:t>
             </a:fld>
-            <a:endParaRPr lang="de-DE"/>
+            <a:endParaRPr lang="de-DE" noProof="0"/>
           </a:p>
         </p:txBody>
       </p:sp>
     </p:spTree>
     <p:extLst>
       <p:ext uri="{BB962C8B-B14F-4D97-AF65-F5344CB8AC3E}">
-        <p14:creationId xmlns:p14="http://schemas.microsoft.com/office/powerpoint/2010/main" val="493077637"/>
+        <p14:creationId xmlns:p14="http://schemas.microsoft.com/office/powerpoint/2010/main" val="3632476615"/>
       </p:ext>
     </p:extLst>
   </p:cSld>
@@ -4450,7 +4433,10 @@
           <a:bodyPr/>
           <a:lstStyle/>
           <a:p>
-            <a:endParaRPr lang="de-DE"/>
+            <a:r>
+              <a:rPr lang="de-CH" dirty="0"/>
+              <a:t>Marco</a:t>
+            </a:r>
           </a:p>
         </p:txBody>
       </p:sp>
@@ -4470,17 +4456,17 @@
           <a:lstStyle/>
           <a:p>
             <a:fld id="{D4C745B4-E2A0-42CC-9FED-47B6EC2BC2F2}" type="slidenum">
-              <a:rPr lang="de-DE" smtClean="0"/>
-              <a:t>10</a:t>
+              <a:rPr lang="de-DE" noProof="0" smtClean="0"/>
+              <a:t>3</a:t>
             </a:fld>
-            <a:endParaRPr lang="de-DE"/>
+            <a:endParaRPr lang="de-DE" noProof="0"/>
           </a:p>
         </p:txBody>
       </p:sp>
     </p:spTree>
     <p:extLst>
       <p:ext uri="{BB962C8B-B14F-4D97-AF65-F5344CB8AC3E}">
-        <p14:creationId xmlns:p14="http://schemas.microsoft.com/office/powerpoint/2010/main" val="2939750654"/>
+        <p14:creationId xmlns:p14="http://schemas.microsoft.com/office/powerpoint/2010/main" val="1717950726"/>
       </p:ext>
     </p:extLst>
   </p:cSld>
@@ -4534,7 +4520,10 @@
           <a:bodyPr/>
           <a:lstStyle/>
           <a:p>
-            <a:endParaRPr lang="de-DE"/>
+            <a:r>
+              <a:rPr lang="de-CH" dirty="0"/>
+              <a:t>Marco</a:t>
+            </a:r>
           </a:p>
         </p:txBody>
       </p:sp>
@@ -4554,17 +4543,496 @@
           <a:lstStyle/>
           <a:p>
             <a:fld id="{D4C745B4-E2A0-42CC-9FED-47B6EC2BC2F2}" type="slidenum">
-              <a:rPr lang="de-DE" smtClean="0"/>
-              <a:t>11</a:t>
+              <a:rPr lang="de-DE" noProof="0" smtClean="0"/>
+              <a:t>4</a:t>
             </a:fld>
-            <a:endParaRPr lang="de-DE"/>
+            <a:endParaRPr lang="de-DE" noProof="0"/>
           </a:p>
         </p:txBody>
       </p:sp>
     </p:spTree>
     <p:extLst>
       <p:ext uri="{BB962C8B-B14F-4D97-AF65-F5344CB8AC3E}">
-        <p14:creationId xmlns:p14="http://schemas.microsoft.com/office/powerpoint/2010/main" val="825276934"/>
+        <p14:creationId xmlns:p14="http://schemas.microsoft.com/office/powerpoint/2010/main" val="714526312"/>
+      </p:ext>
+    </p:extLst>
+  </p:cSld>
+  <p:clrMapOvr>
+    <a:masterClrMapping/>
+  </p:clrMapOvr>
+</p:notes>
+</file>
+
+<file path=ppt/notesSlides/notesSlide5.xml><?xml version="1.0" encoding="utf-8"?>
+<p:notes xmlns:a="http://schemas.openxmlformats.org/drawingml/2006/main" xmlns:r="http://schemas.openxmlformats.org/officeDocument/2006/relationships" xmlns:p="http://schemas.openxmlformats.org/presentationml/2006/main">
+  <p:cSld>
+    <p:spTree>
+      <p:nvGrpSpPr>
+        <p:cNvPr id="1" name=""/>
+        <p:cNvGrpSpPr/>
+        <p:nvPr/>
+      </p:nvGrpSpPr>
+      <p:grpSpPr>
+        <a:xfrm>
+          <a:off x="0" y="0"/>
+          <a:ext cx="0" cy="0"/>
+          <a:chOff x="0" y="0"/>
+          <a:chExt cx="0" cy="0"/>
+        </a:xfrm>
+      </p:grpSpPr>
+      <p:sp>
+        <p:nvSpPr>
+          <p:cNvPr id="2" name="Folienbildplatzhalter 1"/>
+          <p:cNvSpPr>
+            <a:spLocks noGrp="1" noRot="1" noChangeAspect="1"/>
+          </p:cNvSpPr>
+          <p:nvPr>
+            <p:ph type="sldImg"/>
+          </p:nvPr>
+        </p:nvSpPr>
+        <p:spPr/>
+      </p:sp>
+      <p:sp>
+        <p:nvSpPr>
+          <p:cNvPr id="3" name="Notizenplatzhalter 2"/>
+          <p:cNvSpPr>
+            <a:spLocks noGrp="1"/>
+          </p:cNvSpPr>
+          <p:nvPr>
+            <p:ph type="body" idx="1"/>
+          </p:nvPr>
+        </p:nvSpPr>
+        <p:spPr/>
+        <p:txBody>
+          <a:bodyPr/>
+          <a:lstStyle/>
+          <a:p>
+            <a:r>
+              <a:rPr lang="de-CH" dirty="0"/>
+              <a:t>Jonas</a:t>
+            </a:r>
+          </a:p>
+        </p:txBody>
+      </p:sp>
+      <p:sp>
+        <p:nvSpPr>
+          <p:cNvPr id="4" name="Foliennummernplatzhalter 3"/>
+          <p:cNvSpPr>
+            <a:spLocks noGrp="1"/>
+          </p:cNvSpPr>
+          <p:nvPr>
+            <p:ph type="sldNum" sz="quarter" idx="5"/>
+          </p:nvPr>
+        </p:nvSpPr>
+        <p:spPr/>
+        <p:txBody>
+          <a:bodyPr/>
+          <a:lstStyle/>
+          <a:p>
+            <a:fld id="{D4C745B4-E2A0-42CC-9FED-47B6EC2BC2F2}" type="slidenum">
+              <a:rPr lang="de-DE" noProof="0" smtClean="0"/>
+              <a:t>5</a:t>
+            </a:fld>
+            <a:endParaRPr lang="de-DE" noProof="0"/>
+          </a:p>
+        </p:txBody>
+      </p:sp>
+    </p:spTree>
+    <p:extLst>
+      <p:ext uri="{BB962C8B-B14F-4D97-AF65-F5344CB8AC3E}">
+        <p14:creationId xmlns:p14="http://schemas.microsoft.com/office/powerpoint/2010/main" val="276424470"/>
+      </p:ext>
+    </p:extLst>
+  </p:cSld>
+  <p:clrMapOvr>
+    <a:masterClrMapping/>
+  </p:clrMapOvr>
+</p:notes>
+</file>
+
+<file path=ppt/notesSlides/notesSlide6.xml><?xml version="1.0" encoding="utf-8"?>
+<p:notes xmlns:a="http://schemas.openxmlformats.org/drawingml/2006/main" xmlns:r="http://schemas.openxmlformats.org/officeDocument/2006/relationships" xmlns:p="http://schemas.openxmlformats.org/presentationml/2006/main">
+  <p:cSld>
+    <p:spTree>
+      <p:nvGrpSpPr>
+        <p:cNvPr id="1" name=""/>
+        <p:cNvGrpSpPr/>
+        <p:nvPr/>
+      </p:nvGrpSpPr>
+      <p:grpSpPr>
+        <a:xfrm>
+          <a:off x="0" y="0"/>
+          <a:ext cx="0" cy="0"/>
+          <a:chOff x="0" y="0"/>
+          <a:chExt cx="0" cy="0"/>
+        </a:xfrm>
+      </p:grpSpPr>
+      <p:sp>
+        <p:nvSpPr>
+          <p:cNvPr id="2" name="Folienbildplatzhalter 1"/>
+          <p:cNvSpPr>
+            <a:spLocks noGrp="1" noRot="1" noChangeAspect="1"/>
+          </p:cNvSpPr>
+          <p:nvPr>
+            <p:ph type="sldImg"/>
+          </p:nvPr>
+        </p:nvSpPr>
+        <p:spPr/>
+      </p:sp>
+      <p:sp>
+        <p:nvSpPr>
+          <p:cNvPr id="3" name="Notizenplatzhalter 2"/>
+          <p:cNvSpPr>
+            <a:spLocks noGrp="1"/>
+          </p:cNvSpPr>
+          <p:nvPr>
+            <p:ph type="body" idx="1"/>
+          </p:nvPr>
+        </p:nvSpPr>
+        <p:spPr/>
+        <p:txBody>
+          <a:bodyPr/>
+          <a:lstStyle/>
+          <a:p>
+            <a:r>
+              <a:rPr lang="de-CH" dirty="0"/>
+              <a:t>Marco</a:t>
+            </a:r>
+          </a:p>
+        </p:txBody>
+      </p:sp>
+      <p:sp>
+        <p:nvSpPr>
+          <p:cNvPr id="4" name="Foliennummernplatzhalter 3"/>
+          <p:cNvSpPr>
+            <a:spLocks noGrp="1"/>
+          </p:cNvSpPr>
+          <p:nvPr>
+            <p:ph type="sldNum" sz="quarter" idx="5"/>
+          </p:nvPr>
+        </p:nvSpPr>
+        <p:spPr/>
+        <p:txBody>
+          <a:bodyPr/>
+          <a:lstStyle/>
+          <a:p>
+            <a:fld id="{D4C745B4-E2A0-42CC-9FED-47B6EC2BC2F2}" type="slidenum">
+              <a:rPr lang="de-DE" noProof="0" smtClean="0"/>
+              <a:t>6</a:t>
+            </a:fld>
+            <a:endParaRPr lang="de-DE" noProof="0"/>
+          </a:p>
+        </p:txBody>
+      </p:sp>
+    </p:spTree>
+    <p:extLst>
+      <p:ext uri="{BB962C8B-B14F-4D97-AF65-F5344CB8AC3E}">
+        <p14:creationId xmlns:p14="http://schemas.microsoft.com/office/powerpoint/2010/main" val="259594035"/>
+      </p:ext>
+    </p:extLst>
+  </p:cSld>
+  <p:clrMapOvr>
+    <a:masterClrMapping/>
+  </p:clrMapOvr>
+</p:notes>
+</file>
+
+<file path=ppt/notesSlides/notesSlide7.xml><?xml version="1.0" encoding="utf-8"?>
+<p:notes xmlns:a="http://schemas.openxmlformats.org/drawingml/2006/main" xmlns:r="http://schemas.openxmlformats.org/officeDocument/2006/relationships" xmlns:p="http://schemas.openxmlformats.org/presentationml/2006/main">
+  <p:cSld>
+    <p:spTree>
+      <p:nvGrpSpPr>
+        <p:cNvPr id="1" name=""/>
+        <p:cNvGrpSpPr/>
+        <p:nvPr/>
+      </p:nvGrpSpPr>
+      <p:grpSpPr>
+        <a:xfrm>
+          <a:off x="0" y="0"/>
+          <a:ext cx="0" cy="0"/>
+          <a:chOff x="0" y="0"/>
+          <a:chExt cx="0" cy="0"/>
+        </a:xfrm>
+      </p:grpSpPr>
+      <p:sp>
+        <p:nvSpPr>
+          <p:cNvPr id="2" name="Folienbildplatzhalter 1"/>
+          <p:cNvSpPr>
+            <a:spLocks noGrp="1" noRot="1" noChangeAspect="1"/>
+          </p:cNvSpPr>
+          <p:nvPr>
+            <p:ph type="sldImg"/>
+          </p:nvPr>
+        </p:nvSpPr>
+        <p:spPr/>
+      </p:sp>
+      <p:sp>
+        <p:nvSpPr>
+          <p:cNvPr id="3" name="Notizenplatzhalter 2"/>
+          <p:cNvSpPr>
+            <a:spLocks noGrp="1"/>
+          </p:cNvSpPr>
+          <p:nvPr>
+            <p:ph type="body" idx="1"/>
+          </p:nvPr>
+        </p:nvSpPr>
+        <p:spPr/>
+        <p:txBody>
+          <a:bodyPr/>
+          <a:lstStyle/>
+          <a:p>
+            <a:r>
+              <a:rPr lang="de-CH" dirty="0"/>
+              <a:t>Jonas</a:t>
+            </a:r>
+          </a:p>
+        </p:txBody>
+      </p:sp>
+      <p:sp>
+        <p:nvSpPr>
+          <p:cNvPr id="4" name="Foliennummernplatzhalter 3"/>
+          <p:cNvSpPr>
+            <a:spLocks noGrp="1"/>
+          </p:cNvSpPr>
+          <p:nvPr>
+            <p:ph type="sldNum" sz="quarter" idx="5"/>
+          </p:nvPr>
+        </p:nvSpPr>
+        <p:spPr/>
+        <p:txBody>
+          <a:bodyPr/>
+          <a:lstStyle/>
+          <a:p>
+            <a:fld id="{D4C745B4-E2A0-42CC-9FED-47B6EC2BC2F2}" type="slidenum">
+              <a:rPr lang="de-DE" noProof="0" smtClean="0"/>
+              <a:t>7</a:t>
+            </a:fld>
+            <a:endParaRPr lang="de-DE" noProof="0"/>
+          </a:p>
+        </p:txBody>
+      </p:sp>
+    </p:spTree>
+    <p:extLst>
+      <p:ext uri="{BB962C8B-B14F-4D97-AF65-F5344CB8AC3E}">
+        <p14:creationId xmlns:p14="http://schemas.microsoft.com/office/powerpoint/2010/main" val="3958797812"/>
+      </p:ext>
+    </p:extLst>
+  </p:cSld>
+  <p:clrMapOvr>
+    <a:masterClrMapping/>
+  </p:clrMapOvr>
+</p:notes>
+</file>
+
+<file path=ppt/notesSlides/notesSlide8.xml><?xml version="1.0" encoding="utf-8"?>
+<p:notes xmlns:a="http://schemas.openxmlformats.org/drawingml/2006/main" xmlns:r="http://schemas.openxmlformats.org/officeDocument/2006/relationships" xmlns:p="http://schemas.openxmlformats.org/presentationml/2006/main">
+  <p:cSld>
+    <p:spTree>
+      <p:nvGrpSpPr>
+        <p:cNvPr id="1" name=""/>
+        <p:cNvGrpSpPr/>
+        <p:nvPr/>
+      </p:nvGrpSpPr>
+      <p:grpSpPr>
+        <a:xfrm>
+          <a:off x="0" y="0"/>
+          <a:ext cx="0" cy="0"/>
+          <a:chOff x="0" y="0"/>
+          <a:chExt cx="0" cy="0"/>
+        </a:xfrm>
+      </p:grpSpPr>
+      <p:sp>
+        <p:nvSpPr>
+          <p:cNvPr id="2" name="Folienbildplatzhalter 1"/>
+          <p:cNvSpPr>
+            <a:spLocks noGrp="1" noRot="1" noChangeAspect="1"/>
+          </p:cNvSpPr>
+          <p:nvPr>
+            <p:ph type="sldImg"/>
+          </p:nvPr>
+        </p:nvSpPr>
+        <p:spPr/>
+      </p:sp>
+      <p:sp>
+        <p:nvSpPr>
+          <p:cNvPr id="3" name="Notizenplatzhalter 2"/>
+          <p:cNvSpPr>
+            <a:spLocks noGrp="1"/>
+          </p:cNvSpPr>
+          <p:nvPr>
+            <p:ph type="body" idx="1"/>
+          </p:nvPr>
+        </p:nvSpPr>
+        <p:spPr/>
+        <p:txBody>
+          <a:bodyPr/>
+          <a:lstStyle/>
+          <a:p>
+            <a:r>
+              <a:rPr lang="de-CH" dirty="0"/>
+              <a:t>Jonas</a:t>
+            </a:r>
+          </a:p>
+        </p:txBody>
+      </p:sp>
+      <p:sp>
+        <p:nvSpPr>
+          <p:cNvPr id="4" name="Foliennummernplatzhalter 3"/>
+          <p:cNvSpPr>
+            <a:spLocks noGrp="1"/>
+          </p:cNvSpPr>
+          <p:nvPr>
+            <p:ph type="sldNum" sz="quarter" idx="5"/>
+          </p:nvPr>
+        </p:nvSpPr>
+        <p:spPr/>
+        <p:txBody>
+          <a:bodyPr/>
+          <a:lstStyle/>
+          <a:p>
+            <a:fld id="{D4C745B4-E2A0-42CC-9FED-47B6EC2BC2F2}" type="slidenum">
+              <a:rPr lang="de-DE" noProof="0" smtClean="0"/>
+              <a:t>8</a:t>
+            </a:fld>
+            <a:endParaRPr lang="de-DE" noProof="0"/>
+          </a:p>
+        </p:txBody>
+      </p:sp>
+    </p:spTree>
+    <p:extLst>
+      <p:ext uri="{BB962C8B-B14F-4D97-AF65-F5344CB8AC3E}">
+        <p14:creationId xmlns:p14="http://schemas.microsoft.com/office/powerpoint/2010/main" val="1122307769"/>
+      </p:ext>
+    </p:extLst>
+  </p:cSld>
+  <p:clrMapOvr>
+    <a:masterClrMapping/>
+  </p:clrMapOvr>
+</p:notes>
+</file>
+
+<file path=ppt/notesSlides/notesSlide9.xml><?xml version="1.0" encoding="utf-8"?>
+<p:notes xmlns:a="http://schemas.openxmlformats.org/drawingml/2006/main" xmlns:r="http://schemas.openxmlformats.org/officeDocument/2006/relationships" xmlns:p="http://schemas.openxmlformats.org/presentationml/2006/main">
+  <p:cSld>
+    <p:spTree>
+      <p:nvGrpSpPr>
+        <p:cNvPr id="1" name=""/>
+        <p:cNvGrpSpPr/>
+        <p:nvPr/>
+      </p:nvGrpSpPr>
+      <p:grpSpPr>
+        <a:xfrm>
+          <a:off x="0" y="0"/>
+          <a:ext cx="0" cy="0"/>
+          <a:chOff x="0" y="0"/>
+          <a:chExt cx="0" cy="0"/>
+        </a:xfrm>
+      </p:grpSpPr>
+      <p:sp>
+        <p:nvSpPr>
+          <p:cNvPr id="2" name="Folienbildplatzhalter 1"/>
+          <p:cNvSpPr>
+            <a:spLocks noGrp="1" noRot="1" noChangeAspect="1"/>
+          </p:cNvSpPr>
+          <p:nvPr>
+            <p:ph type="sldImg"/>
+          </p:nvPr>
+        </p:nvSpPr>
+        <p:spPr/>
+      </p:sp>
+      <p:sp>
+        <p:nvSpPr>
+          <p:cNvPr id="3" name="Notizenplatzhalter 2"/>
+          <p:cNvSpPr>
+            <a:spLocks noGrp="1"/>
+          </p:cNvSpPr>
+          <p:nvPr>
+            <p:ph type="body" idx="1"/>
+          </p:nvPr>
+        </p:nvSpPr>
+        <p:spPr/>
+        <p:txBody>
+          <a:bodyPr/>
+          <a:lstStyle/>
+          <a:p>
+            <a:pPr marL="228600" indent="-228600">
+              <a:buFont typeface="+mj-lt"/>
+              <a:buAutoNum type="arabicPeriod"/>
+            </a:pPr>
+            <a:r>
+              <a:rPr lang="de-DE" dirty="0"/>
+              <a:t>Marco</a:t>
+            </a:r>
+          </a:p>
+          <a:p>
+            <a:pPr marL="228600" indent="-228600">
+              <a:buFont typeface="+mj-lt"/>
+              <a:buAutoNum type="arabicPeriod"/>
+            </a:pPr>
+            <a:r>
+              <a:rPr lang="de-DE" dirty="0"/>
+              <a:t>Jonas</a:t>
+            </a:r>
+          </a:p>
+          <a:p>
+            <a:pPr marL="228600" indent="-228600">
+              <a:buFont typeface="+mj-lt"/>
+              <a:buAutoNum type="arabicPeriod"/>
+            </a:pPr>
+            <a:r>
+              <a:rPr lang="de-DE" dirty="0"/>
+              <a:t>Marco</a:t>
+            </a:r>
+          </a:p>
+          <a:p>
+            <a:pPr marL="228600" indent="-228600">
+              <a:buFont typeface="+mj-lt"/>
+              <a:buAutoNum type="arabicPeriod"/>
+            </a:pPr>
+            <a:r>
+              <a:rPr lang="de-DE" dirty="0"/>
+              <a:t>Marco</a:t>
+            </a:r>
+          </a:p>
+          <a:p>
+            <a:pPr marL="228600" indent="-228600">
+              <a:buFont typeface="+mj-lt"/>
+              <a:buAutoNum type="arabicPeriod"/>
+            </a:pPr>
+            <a:r>
+              <a:rPr lang="de-DE" dirty="0"/>
+              <a:t>Jonas</a:t>
+            </a:r>
+          </a:p>
+        </p:txBody>
+      </p:sp>
+      <p:sp>
+        <p:nvSpPr>
+          <p:cNvPr id="4" name="Foliennummernplatzhalter 3"/>
+          <p:cNvSpPr>
+            <a:spLocks noGrp="1"/>
+          </p:cNvSpPr>
+          <p:nvPr>
+            <p:ph type="sldNum" sz="quarter" idx="5"/>
+          </p:nvPr>
+        </p:nvSpPr>
+        <p:spPr/>
+        <p:txBody>
+          <a:bodyPr/>
+          <a:lstStyle/>
+          <a:p>
+            <a:fld id="{D4C745B4-E2A0-42CC-9FED-47B6EC2BC2F2}" type="slidenum">
+              <a:rPr lang="de-DE" smtClean="0"/>
+              <a:t>9</a:t>
+            </a:fld>
+            <a:endParaRPr lang="de-DE"/>
+          </a:p>
+        </p:txBody>
+      </p:sp>
+    </p:spTree>
+    <p:extLst>
+      <p:ext uri="{BB962C8B-B14F-4D97-AF65-F5344CB8AC3E}">
+        <p14:creationId xmlns:p14="http://schemas.microsoft.com/office/powerpoint/2010/main" val="493077637"/>
       </p:ext>
     </p:extLst>
   </p:cSld>
@@ -5786,7 +6254,7 @@
             <a:pPr rtl="0"/>
             <a:fld id="{35695855-2C3C-4607-B286-469A5D649551}" type="datetime1">
               <a:rPr lang="de-DE" noProof="0" smtClean="0"/>
-              <a:t>12.01.2022</a:t>
+              <a:t>16.01.2022</a:t>
             </a:fld>
             <a:endParaRPr lang="de-DE" noProof="0"/>
           </a:p>
@@ -6026,7 +6494,7 @@
             <a:pPr rtl="0"/>
             <a:fld id="{FC18E9E9-BFF0-4EF4-A26D-5D19B0036F5D}" type="datetime1">
               <a:rPr lang="de-DE" noProof="0" smtClean="0"/>
-              <a:t>12.01.2022</a:t>
+              <a:t>16.01.2022</a:t>
             </a:fld>
             <a:endParaRPr lang="de-DE" noProof="0"/>
           </a:p>
@@ -6208,7 +6676,7 @@
             <a:pPr rtl="0"/>
             <a:fld id="{20A0FE2A-C243-49A6-85D6-34B528E67EA2}" type="datetime1">
               <a:rPr lang="de-DE" noProof="0" smtClean="0"/>
-              <a:t>12.01.2022</a:t>
+              <a:t>16.01.2022</a:t>
             </a:fld>
             <a:endParaRPr lang="de-DE" noProof="0"/>
           </a:p>
@@ -6380,7 +6848,7 @@
             <a:pPr rtl="0"/>
             <a:fld id="{EE50C6DB-F1C6-467F-8CE0-A0346EFFE638}" type="datetime1">
               <a:rPr lang="de-DE" noProof="0" smtClean="0"/>
-              <a:t>12.01.2022</a:t>
+              <a:t>16.01.2022</a:t>
             </a:fld>
             <a:endParaRPr lang="de-DE" noProof="0"/>
           </a:p>
@@ -6659,7 +7127,7 @@
             <a:pPr rtl="0"/>
             <a:fld id="{88FC6C5A-E802-4462-B445-3752E9FABE21}" type="datetime1">
               <a:rPr lang="de-DE" noProof="0" smtClean="0"/>
-              <a:t>12.01.2022</a:t>
+              <a:t>16.01.2022</a:t>
             </a:fld>
             <a:endParaRPr lang="de-DE" noProof="0"/>
           </a:p>
@@ -7861,7 +8329,7 @@
             <a:pPr rtl="0"/>
             <a:fld id="{7C978EDB-C11C-4C48-AD02-A27E3A9F3021}" type="datetime1">
               <a:rPr lang="de-DE" noProof="0" smtClean="0"/>
-              <a:t>12.01.2022</a:t>
+              <a:t>16.01.2022</a:t>
             </a:fld>
             <a:endParaRPr lang="de-DE" noProof="0"/>
           </a:p>
@@ -7921,7 +8389,7 @@
   <p:clrMapOvr>
     <a:masterClrMapping/>
   </p:clrMapOvr>
-  <p:extLst mod="1">
+  <p:extLst>
     <p:ext uri="{DCECCB84-F9BA-43D5-87BE-67443E8EF086}">
       <p15:sldGuideLst xmlns:p15="http://schemas.microsoft.com/office/powerpoint/2012/main"/>
     </p:ext>
@@ -8252,7 +8720,7 @@
             <a:pPr rtl="0"/>
             <a:fld id="{30E61D66-BCE1-42A2-A51D-4FFAED4B1900}" type="datetime1">
               <a:rPr lang="de-DE" noProof="0" smtClean="0"/>
-              <a:t>12.01.2022</a:t>
+              <a:t>16.01.2022</a:t>
             </a:fld>
             <a:endParaRPr lang="de-DE" noProof="0"/>
           </a:p>
@@ -8312,7 +8780,7 @@
   <p:clrMapOvr>
     <a:masterClrMapping/>
   </p:clrMapOvr>
-  <p:extLst mod="1">
+  <p:extLst>
     <p:ext uri="{DCECCB84-F9BA-43D5-87BE-67443E8EF086}">
       <p15:sldGuideLst xmlns:p15="http://schemas.microsoft.com/office/powerpoint/2012/main"/>
     </p:ext>
@@ -8378,7 +8846,7 @@
             <a:pPr rtl="0"/>
             <a:fld id="{82A6A6CE-ADEF-490B-8885-487C6BE9CCEF}" type="datetime1">
               <a:rPr lang="de-DE" noProof="0" smtClean="0"/>
-              <a:t>12.01.2022</a:t>
+              <a:t>16.01.2022</a:t>
             </a:fld>
             <a:endParaRPr lang="de-DE" noProof="0"/>
           </a:p>
@@ -8476,7 +8944,7 @@
             <a:pPr rtl="0"/>
             <a:fld id="{EC55321E-64B6-4F7B-B90E-E11BD8C9B303}" type="datetime1">
               <a:rPr lang="de-DE" noProof="0" smtClean="0"/>
-              <a:t>12.01.2022</a:t>
+              <a:t>16.01.2022</a:t>
             </a:fld>
             <a:endParaRPr lang="de-DE" noProof="0"/>
           </a:p>
@@ -9241,7 +9709,7 @@
             <a:pPr rtl="0"/>
             <a:fld id="{2D8B6F82-F16F-4314-B31A-6A12CD9F4D25}" type="datetime1">
               <a:rPr lang="de-DE" noProof="0" smtClean="0"/>
-              <a:t>12.01.2022</a:t>
+              <a:t>16.01.2022</a:t>
             </a:fld>
             <a:endParaRPr lang="de-DE" noProof="0"/>
           </a:p>
@@ -9349,7 +9817,7 @@
   <p:clrMapOvr>
     <a:masterClrMapping/>
   </p:clrMapOvr>
-  <p:extLst mod="1">
+  <p:extLst>
     <p:ext uri="{DCECCB84-F9BA-43D5-87BE-67443E8EF086}">
       <p15:sldGuideLst xmlns:p15="http://schemas.microsoft.com/office/powerpoint/2012/main">
         <p15:guide id="1" orient="horz" pos="696">
@@ -10084,7 +10552,7 @@
             <a:pPr rtl="0"/>
             <a:fld id="{1C3C8E23-E973-42ED-B43B-DAF54C52B003}" type="datetime1">
               <a:rPr lang="de-DE" noProof="0" smtClean="0"/>
-              <a:t>12.01.2022</a:t>
+              <a:t>16.01.2022</a:t>
             </a:fld>
             <a:endParaRPr lang="de-DE" noProof="0"/>
           </a:p>
@@ -10313,7 +10781,7 @@
             <a:pPr rtl="0"/>
             <a:fld id="{E6CB7931-7355-4552-BD02-BEFEB20ABB1F}" type="datetime1">
               <a:rPr lang="de-DE" noProof="0" smtClean="0"/>
-              <a:t>12.01.2022</a:t>
+              <a:t>16.01.2022</a:t>
             </a:fld>
             <a:endParaRPr lang="de-DE" noProof="0"/>
           </a:p>
@@ -11259,7 +11727,7 @@
       </a:lvl9pPr>
     </p:otherStyle>
   </p:txStyles>
-  <p:extLst mod="1">
+  <p:extLst>
     <p:ext uri="{27BBF7A9-308A-43DC-89C8-2F10F3537804}">
       <p15:sldGuideLst xmlns:p15="http://schemas.microsoft.com/office/powerpoint/2012/main">
         <p15:guide id="1" pos="792">
@@ -11493,6 +11961,110 @@
 </file>
 
 <file path=ppt/slides/slide10.xml><?xml version="1.0" encoding="utf-8"?>
+<p:sld xmlns:a="http://schemas.openxmlformats.org/drawingml/2006/main" xmlns:r="http://schemas.openxmlformats.org/officeDocument/2006/relationships" xmlns:p="http://schemas.openxmlformats.org/presentationml/2006/main">
+  <p:cSld>
+    <p:spTree>
+      <p:nvGrpSpPr>
+        <p:cNvPr id="1" name=""/>
+        <p:cNvGrpSpPr/>
+        <p:nvPr/>
+      </p:nvGrpSpPr>
+      <p:grpSpPr>
+        <a:xfrm>
+          <a:off x="0" y="0"/>
+          <a:ext cx="0" cy="0"/>
+          <a:chOff x="0" y="0"/>
+          <a:chExt cx="0" cy="0"/>
+        </a:xfrm>
+      </p:grpSpPr>
+      <p:sp>
+        <p:nvSpPr>
+          <p:cNvPr id="2" name="Titel 1">
+            <a:extLst>
+              <a:ext uri="{FF2B5EF4-FFF2-40B4-BE49-F238E27FC236}">
+                <a16:creationId xmlns:a16="http://schemas.microsoft.com/office/drawing/2014/main" id="{A5E794D9-6FBA-4BB2-991E-F1A0761876FB}"/>
+              </a:ext>
+            </a:extLst>
+          </p:cNvPr>
+          <p:cNvSpPr>
+            <a:spLocks noGrp="1"/>
+          </p:cNvSpPr>
+          <p:nvPr>
+            <p:ph type="title"/>
+          </p:nvPr>
+        </p:nvSpPr>
+        <p:spPr/>
+        <p:txBody>
+          <a:bodyPr/>
+          <a:lstStyle/>
+          <a:p>
+            <a:r>
+              <a:rPr lang="de-CH" dirty="0"/>
+              <a:t>Was würden wir das nächste mal anders machen</a:t>
+            </a:r>
+          </a:p>
+        </p:txBody>
+      </p:sp>
+      <p:sp>
+        <p:nvSpPr>
+          <p:cNvPr id="3" name="Inhaltsplatzhalter 2">
+            <a:extLst>
+              <a:ext uri="{FF2B5EF4-FFF2-40B4-BE49-F238E27FC236}">
+                <a16:creationId xmlns:a16="http://schemas.microsoft.com/office/drawing/2014/main" id="{D4DE1FD0-252C-41FF-951A-83176854AF95}"/>
+              </a:ext>
+            </a:extLst>
+          </p:cNvPr>
+          <p:cNvSpPr>
+            <a:spLocks noGrp="1"/>
+          </p:cNvSpPr>
+          <p:nvPr>
+            <p:ph idx="1"/>
+          </p:nvPr>
+        </p:nvSpPr>
+        <p:spPr/>
+        <p:txBody>
+          <a:bodyPr/>
+          <a:lstStyle/>
+          <a:p>
+            <a:r>
+              <a:rPr lang="de-CH" dirty="0"/>
+              <a:t>Einsatz von </a:t>
+            </a:r>
+            <a:r>
+              <a:rPr lang="de-CH" dirty="0" err="1"/>
+              <a:t>spezalisierten</a:t>
+            </a:r>
+            <a:r>
+              <a:rPr lang="de-CH" dirty="0"/>
+              <a:t> Libraries / Netzwerken wie Facebook Prophet ( </a:t>
+            </a:r>
+            <a:r>
+              <a:rPr lang="de-CH" dirty="0">
+                <a:hlinkClick r:id="rId2"/>
+              </a:rPr>
+              <a:t>https://github.com/facebook/prophet</a:t>
+            </a:r>
+            <a:r>
+              <a:rPr lang="de-CH" dirty="0"/>
+              <a:t> )</a:t>
+            </a:r>
+          </a:p>
+        </p:txBody>
+      </p:sp>
+    </p:spTree>
+    <p:extLst>
+      <p:ext uri="{BB962C8B-B14F-4D97-AF65-F5344CB8AC3E}">
+        <p14:creationId xmlns:p14="http://schemas.microsoft.com/office/powerpoint/2010/main" val="3954962109"/>
+      </p:ext>
+    </p:extLst>
+  </p:cSld>
+  <p:clrMapOvr>
+    <a:masterClrMapping/>
+  </p:clrMapOvr>
+</p:sld>
+</file>
+
+<file path=ppt/slides/slide11.xml><?xml version="1.0" encoding="utf-8"?>
 <p:sld xmlns:a="http://schemas.openxmlformats.org/drawingml/2006/main" xmlns:r="http://schemas.openxmlformats.org/officeDocument/2006/relationships" xmlns:p="http://schemas.openxmlformats.org/presentationml/2006/main">
   <p:cSld>
     <p:bg>
@@ -13445,7 +14017,7 @@
 </p:sld>
 </file>
 
-<file path=ppt/slides/slide11.xml><?xml version="1.0" encoding="utf-8"?>
+<file path=ppt/slides/slide12.xml><?xml version="1.0" encoding="utf-8"?>
 <p:sld xmlns:a="http://schemas.openxmlformats.org/drawingml/2006/main" xmlns:r="http://schemas.openxmlformats.org/officeDocument/2006/relationships" xmlns:p="http://schemas.openxmlformats.org/presentationml/2006/main">
   <p:cSld>
     <p:spTree>
@@ -13583,7 +14155,9 @@
         </p:nvSpPr>
         <p:spPr/>
         <p:txBody>
-          <a:bodyPr/>
+          <a:bodyPr>
+            <a:normAutofit lnSpcReduction="10000"/>
+          </a:bodyPr>
           <a:lstStyle/>
           <a:p>
             <a:r>
@@ -13625,6 +14199,12 @@
             <a:r>
               <a:rPr lang="de-CH" dirty="0"/>
               <a:t>Erkenntnisse</a:t>
+            </a:r>
+          </a:p>
+          <a:p>
+            <a:r>
+              <a:rPr lang="de-CH" dirty="0"/>
+              <a:t>Was würden wir das nächste Mal anders machen?</a:t>
             </a:r>
           </a:p>
           <a:p>
@@ -13769,7 +14349,7 @@
           <p:nvPr/>
         </p:nvPicPr>
         <p:blipFill>
-          <a:blip r:embed="rId2"/>
+          <a:blip r:embed="rId3"/>
           <a:stretch>
             <a:fillRect/>
           </a:stretch>
@@ -13879,7 +14459,7 @@
             </a:r>
             <a:r>
               <a:rPr lang="de-CH" dirty="0">
-                <a:hlinkClick r:id="rId2"/>
+                <a:hlinkClick r:id="rId3"/>
               </a:rPr>
               <a:t>https://github.com/maggi71/ml-corona</a:t>
             </a:r>
@@ -14011,7 +14591,7 @@
             </a:r>
             <a:r>
               <a:rPr lang="de-CH" dirty="0">
-                <a:hlinkClick r:id="rId2"/>
+                <a:hlinkClick r:id="rId3"/>
               </a:rPr>
               <a:t>https://opendata.swiss/de/dataset/covid-19-schweiz</a:t>
             </a:r>
@@ -14168,13 +14748,6 @@
             <a:pPr lvl="1"/>
             <a:r>
               <a:rPr lang="de-CH" dirty="0"/>
-              <a:t>Aufbau des Modells</a:t>
-            </a:r>
-          </a:p>
-          <a:p>
-            <a:pPr lvl="1"/>
-            <a:r>
-              <a:rPr lang="de-CH" dirty="0"/>
               <a:t>Trainieren</a:t>
             </a:r>
           </a:p>
@@ -14187,10 +14760,24 @@
             <a:endParaRPr lang="de-CH" dirty="0"/>
           </a:p>
           <a:p>
+            <a:pPr lvl="1"/>
             <a:r>
               <a:rPr lang="de-CH" dirty="0"/>
-              <a:t>Notebooks für Daten Sammeln und Bereinigen, Modelle</a:t>
+              <a:t>Vergleich </a:t>
             </a:r>
+            <a:r>
+              <a:rPr lang="de-CH" dirty="0" err="1"/>
+              <a:t>Prediction</a:t>
+            </a:r>
+            <a:r>
+              <a:rPr lang="de-CH" dirty="0"/>
+              <a:t> mit </a:t>
+            </a:r>
+            <a:r>
+              <a:rPr lang="de-CH"/>
+              <a:t>Ground Truth</a:t>
+            </a:r>
+            <a:endParaRPr lang="de-CH" dirty="0"/>
           </a:p>
         </p:txBody>
       </p:sp>

</xml_diff>

<commit_message>
add some comment to pptx
</commit_message>
<xml_diff>
--- a/resources/documentation/Abschlusspraesentation.pptx
+++ b/resources/documentation/Abschlusspraesentation.pptx
@@ -4699,6 +4699,21 @@
               <a:t>Marco</a:t>
             </a:r>
           </a:p>
+          <a:p>
+            <a:endParaRPr lang="de-CH" dirty="0"/>
+          </a:p>
+          <a:p>
+            <a:r>
+              <a:rPr lang="de-CH" dirty="0"/>
+              <a:t>Schon durchgeführt da bei mir lokal über 1 Minute</a:t>
+            </a:r>
+          </a:p>
+          <a:p>
+            <a:r>
+              <a:rPr lang="de-CH" dirty="0"/>
+              <a:t>Grafik 300 Batches und der Loss Wert</a:t>
+            </a:r>
+          </a:p>
         </p:txBody>
       </p:sp>
       <p:sp>
@@ -14771,13 +14786,8 @@
             </a:r>
             <a:r>
               <a:rPr lang="de-CH" dirty="0"/>
-              <a:t> mit </a:t>
+              <a:t> mit Ground Truth</a:t>
             </a:r>
-            <a:r>
-              <a:rPr lang="de-CH"/>
-              <a:t>Ground Truth</a:t>
-            </a:r>
-            <a:endParaRPr lang="de-CH" dirty="0"/>
           </a:p>
         </p:txBody>
       </p:sp>

</xml_diff>

<commit_message>
remove was würden wir besser machen
</commit_message>
<xml_diff>
--- a/resources/documentation/Abschlusspraesentation.pptx
+++ b/resources/documentation/Abschlusspraesentation.pptx
@@ -5,10 +5,10 @@
     <p:sldMasterId id="2147483660" r:id="rId1"/>
   </p:sldMasterIdLst>
   <p:notesMasterIdLst>
-    <p:notesMasterId r:id="rId14"/>
+    <p:notesMasterId r:id="rId13"/>
   </p:notesMasterIdLst>
   <p:handoutMasterIdLst>
-    <p:handoutMasterId r:id="rId15"/>
+    <p:handoutMasterId r:id="rId14"/>
   </p:handoutMasterIdLst>
   <p:sldIdLst>
     <p:sldId id="256" r:id="rId2"/>
@@ -20,9 +20,8 @@
     <p:sldId id="269" r:id="rId8"/>
     <p:sldId id="273" r:id="rId9"/>
     <p:sldId id="260" r:id="rId10"/>
-    <p:sldId id="274" r:id="rId11"/>
-    <p:sldId id="263" r:id="rId12"/>
-    <p:sldId id="265" r:id="rId13"/>
+    <p:sldId id="263" r:id="rId11"/>
+    <p:sldId id="265" r:id="rId12"/>
   </p:sldIdLst>
   <p:sldSz cx="12192000" cy="6858000"/>
   <p:notesSz cx="6858000" cy="9144000"/>
@@ -3602,7 +3601,7 @@
           <a:p>
             <a:fld id="{65A80223-0394-4653-850A-5CFB486BDE83}" type="datetime1">
               <a:rPr lang="de-DE" smtClean="0"/>
-              <a:t>16.01.2022</a:t>
+              <a:t>17.01.2022</a:t>
             </a:fld>
             <a:endParaRPr lang="de-DE" dirty="0"/>
           </a:p>
@@ -3780,7 +3779,7 @@
             <a:fld id="{AFB9EE13-CF4B-4779-BA20-982008386F3C}" type="datetime1">
               <a:rPr lang="de-DE" smtClean="0"/>
               <a:pPr/>
-              <a:t>16.01.2022</a:t>
+              <a:t>17.01.2022</a:t>
             </a:fld>
             <a:endParaRPr lang="de-DE" dirty="0"/>
           </a:p>
@@ -4199,7 +4198,7 @@
           <a:p>
             <a:fld id="{D4C745B4-E2A0-42CC-9FED-47B6EC2BC2F2}" type="slidenum">
               <a:rPr lang="de-DE" smtClean="0"/>
-              <a:t>11</a:t>
+              <a:t>10</a:t>
             </a:fld>
             <a:endParaRPr lang="de-DE"/>
           </a:p>
@@ -4283,7 +4282,7 @@
           <a:p>
             <a:fld id="{D4C745B4-E2A0-42CC-9FED-47B6EC2BC2F2}" type="slidenum">
               <a:rPr lang="de-DE" smtClean="0"/>
-              <a:t>12</a:t>
+              <a:t>11</a:t>
             </a:fld>
             <a:endParaRPr lang="de-DE"/>
           </a:p>
@@ -6269,7 +6268,7 @@
             <a:pPr rtl="0"/>
             <a:fld id="{35695855-2C3C-4607-B286-469A5D649551}" type="datetime1">
               <a:rPr lang="de-DE" noProof="0" smtClean="0"/>
-              <a:t>16.01.2022</a:t>
+              <a:t>17.01.2022</a:t>
             </a:fld>
             <a:endParaRPr lang="de-DE" noProof="0"/>
           </a:p>
@@ -6509,7 +6508,7 @@
             <a:pPr rtl="0"/>
             <a:fld id="{FC18E9E9-BFF0-4EF4-A26D-5D19B0036F5D}" type="datetime1">
               <a:rPr lang="de-DE" noProof="0" smtClean="0"/>
-              <a:t>16.01.2022</a:t>
+              <a:t>17.01.2022</a:t>
             </a:fld>
             <a:endParaRPr lang="de-DE" noProof="0"/>
           </a:p>
@@ -6691,7 +6690,7 @@
             <a:pPr rtl="0"/>
             <a:fld id="{20A0FE2A-C243-49A6-85D6-34B528E67EA2}" type="datetime1">
               <a:rPr lang="de-DE" noProof="0" smtClean="0"/>
-              <a:t>16.01.2022</a:t>
+              <a:t>17.01.2022</a:t>
             </a:fld>
             <a:endParaRPr lang="de-DE" noProof="0"/>
           </a:p>
@@ -6863,7 +6862,7 @@
             <a:pPr rtl="0"/>
             <a:fld id="{EE50C6DB-F1C6-467F-8CE0-A0346EFFE638}" type="datetime1">
               <a:rPr lang="de-DE" noProof="0" smtClean="0"/>
-              <a:t>16.01.2022</a:t>
+              <a:t>17.01.2022</a:t>
             </a:fld>
             <a:endParaRPr lang="de-DE" noProof="0"/>
           </a:p>
@@ -7142,7 +7141,7 @@
             <a:pPr rtl="0"/>
             <a:fld id="{88FC6C5A-E802-4462-B445-3752E9FABE21}" type="datetime1">
               <a:rPr lang="de-DE" noProof="0" smtClean="0"/>
-              <a:t>16.01.2022</a:t>
+              <a:t>17.01.2022</a:t>
             </a:fld>
             <a:endParaRPr lang="de-DE" noProof="0"/>
           </a:p>
@@ -8344,7 +8343,7 @@
             <a:pPr rtl="0"/>
             <a:fld id="{7C978EDB-C11C-4C48-AD02-A27E3A9F3021}" type="datetime1">
               <a:rPr lang="de-DE" noProof="0" smtClean="0"/>
-              <a:t>16.01.2022</a:t>
+              <a:t>17.01.2022</a:t>
             </a:fld>
             <a:endParaRPr lang="de-DE" noProof="0"/>
           </a:p>
@@ -8735,7 +8734,7 @@
             <a:pPr rtl="0"/>
             <a:fld id="{30E61D66-BCE1-42A2-A51D-4FFAED4B1900}" type="datetime1">
               <a:rPr lang="de-DE" noProof="0" smtClean="0"/>
-              <a:t>16.01.2022</a:t>
+              <a:t>17.01.2022</a:t>
             </a:fld>
             <a:endParaRPr lang="de-DE" noProof="0"/>
           </a:p>
@@ -8861,7 +8860,7 @@
             <a:pPr rtl="0"/>
             <a:fld id="{82A6A6CE-ADEF-490B-8885-487C6BE9CCEF}" type="datetime1">
               <a:rPr lang="de-DE" noProof="0" smtClean="0"/>
-              <a:t>16.01.2022</a:t>
+              <a:t>17.01.2022</a:t>
             </a:fld>
             <a:endParaRPr lang="de-DE" noProof="0"/>
           </a:p>
@@ -8959,7 +8958,7 @@
             <a:pPr rtl="0"/>
             <a:fld id="{EC55321E-64B6-4F7B-B90E-E11BD8C9B303}" type="datetime1">
               <a:rPr lang="de-DE" noProof="0" smtClean="0"/>
-              <a:t>16.01.2022</a:t>
+              <a:t>17.01.2022</a:t>
             </a:fld>
             <a:endParaRPr lang="de-DE" noProof="0"/>
           </a:p>
@@ -9724,7 +9723,7 @@
             <a:pPr rtl="0"/>
             <a:fld id="{2D8B6F82-F16F-4314-B31A-6A12CD9F4D25}" type="datetime1">
               <a:rPr lang="de-DE" noProof="0" smtClean="0"/>
-              <a:t>16.01.2022</a:t>
+              <a:t>17.01.2022</a:t>
             </a:fld>
             <a:endParaRPr lang="de-DE" noProof="0"/>
           </a:p>
@@ -10567,7 +10566,7 @@
             <a:pPr rtl="0"/>
             <a:fld id="{1C3C8E23-E973-42ED-B43B-DAF54C52B003}" type="datetime1">
               <a:rPr lang="de-DE" noProof="0" smtClean="0"/>
-              <a:t>16.01.2022</a:t>
+              <a:t>17.01.2022</a:t>
             </a:fld>
             <a:endParaRPr lang="de-DE" noProof="0"/>
           </a:p>
@@ -10796,7 +10795,7 @@
             <a:pPr rtl="0"/>
             <a:fld id="{E6CB7931-7355-4552-BD02-BEFEB20ABB1F}" type="datetime1">
               <a:rPr lang="de-DE" noProof="0" smtClean="0"/>
-              <a:t>16.01.2022</a:t>
+              <a:t>17.01.2022</a:t>
             </a:fld>
             <a:endParaRPr lang="de-DE" noProof="0"/>
           </a:p>
@@ -11978,110 +11977,6 @@
 <file path=ppt/slides/slide10.xml><?xml version="1.0" encoding="utf-8"?>
 <p:sld xmlns:a="http://schemas.openxmlformats.org/drawingml/2006/main" xmlns:r="http://schemas.openxmlformats.org/officeDocument/2006/relationships" xmlns:p="http://schemas.openxmlformats.org/presentationml/2006/main">
   <p:cSld>
-    <p:spTree>
-      <p:nvGrpSpPr>
-        <p:cNvPr id="1" name=""/>
-        <p:cNvGrpSpPr/>
-        <p:nvPr/>
-      </p:nvGrpSpPr>
-      <p:grpSpPr>
-        <a:xfrm>
-          <a:off x="0" y="0"/>
-          <a:ext cx="0" cy="0"/>
-          <a:chOff x="0" y="0"/>
-          <a:chExt cx="0" cy="0"/>
-        </a:xfrm>
-      </p:grpSpPr>
-      <p:sp>
-        <p:nvSpPr>
-          <p:cNvPr id="2" name="Titel 1">
-            <a:extLst>
-              <a:ext uri="{FF2B5EF4-FFF2-40B4-BE49-F238E27FC236}">
-                <a16:creationId xmlns:a16="http://schemas.microsoft.com/office/drawing/2014/main" id="{A5E794D9-6FBA-4BB2-991E-F1A0761876FB}"/>
-              </a:ext>
-            </a:extLst>
-          </p:cNvPr>
-          <p:cNvSpPr>
-            <a:spLocks noGrp="1"/>
-          </p:cNvSpPr>
-          <p:nvPr>
-            <p:ph type="title"/>
-          </p:nvPr>
-        </p:nvSpPr>
-        <p:spPr/>
-        <p:txBody>
-          <a:bodyPr/>
-          <a:lstStyle/>
-          <a:p>
-            <a:r>
-              <a:rPr lang="de-CH" dirty="0"/>
-              <a:t>Was würden wir das nächste mal anders machen</a:t>
-            </a:r>
-          </a:p>
-        </p:txBody>
-      </p:sp>
-      <p:sp>
-        <p:nvSpPr>
-          <p:cNvPr id="3" name="Inhaltsplatzhalter 2">
-            <a:extLst>
-              <a:ext uri="{FF2B5EF4-FFF2-40B4-BE49-F238E27FC236}">
-                <a16:creationId xmlns:a16="http://schemas.microsoft.com/office/drawing/2014/main" id="{D4DE1FD0-252C-41FF-951A-83176854AF95}"/>
-              </a:ext>
-            </a:extLst>
-          </p:cNvPr>
-          <p:cNvSpPr>
-            <a:spLocks noGrp="1"/>
-          </p:cNvSpPr>
-          <p:nvPr>
-            <p:ph idx="1"/>
-          </p:nvPr>
-        </p:nvSpPr>
-        <p:spPr/>
-        <p:txBody>
-          <a:bodyPr/>
-          <a:lstStyle/>
-          <a:p>
-            <a:r>
-              <a:rPr lang="de-CH" dirty="0"/>
-              <a:t>Einsatz von </a:t>
-            </a:r>
-            <a:r>
-              <a:rPr lang="de-CH" dirty="0" err="1"/>
-              <a:t>spezalisierten</a:t>
-            </a:r>
-            <a:r>
-              <a:rPr lang="de-CH" dirty="0"/>
-              <a:t> Libraries / Netzwerken wie Facebook Prophet ( </a:t>
-            </a:r>
-            <a:r>
-              <a:rPr lang="de-CH" dirty="0">
-                <a:hlinkClick r:id="rId2"/>
-              </a:rPr>
-              <a:t>https://github.com/facebook/prophet</a:t>
-            </a:r>
-            <a:r>
-              <a:rPr lang="de-CH" dirty="0"/>
-              <a:t> )</a:t>
-            </a:r>
-          </a:p>
-        </p:txBody>
-      </p:sp>
-    </p:spTree>
-    <p:extLst>
-      <p:ext uri="{BB962C8B-B14F-4D97-AF65-F5344CB8AC3E}">
-        <p14:creationId xmlns:p14="http://schemas.microsoft.com/office/powerpoint/2010/main" val="3954962109"/>
-      </p:ext>
-    </p:extLst>
-  </p:cSld>
-  <p:clrMapOvr>
-    <a:masterClrMapping/>
-  </p:clrMapOvr>
-</p:sld>
-</file>
-
-<file path=ppt/slides/slide11.xml><?xml version="1.0" encoding="utf-8"?>
-<p:sld xmlns:a="http://schemas.openxmlformats.org/drawingml/2006/main" xmlns:r="http://schemas.openxmlformats.org/officeDocument/2006/relationships" xmlns:p="http://schemas.openxmlformats.org/presentationml/2006/main">
-  <p:cSld>
     <p:bg>
       <p:bgPr>
         <a:solidFill>
@@ -14032,7 +13927,7 @@
 </p:sld>
 </file>
 
-<file path=ppt/slides/slide12.xml><?xml version="1.0" encoding="utf-8"?>
+<file path=ppt/slides/slide11.xml><?xml version="1.0" encoding="utf-8"?>
 <p:sld xmlns:a="http://schemas.openxmlformats.org/drawingml/2006/main" xmlns:r="http://schemas.openxmlformats.org/officeDocument/2006/relationships" xmlns:p="http://schemas.openxmlformats.org/presentationml/2006/main">
   <p:cSld>
     <p:spTree>
@@ -14171,7 +14066,7 @@
         <p:spPr/>
         <p:txBody>
           <a:bodyPr>
-            <a:normAutofit lnSpcReduction="10000"/>
+            <a:normAutofit/>
           </a:bodyPr>
           <a:lstStyle/>
           <a:p>
@@ -14214,12 +14109,6 @@
             <a:r>
               <a:rPr lang="de-CH" dirty="0"/>
               <a:t>Erkenntnisse</a:t>
-            </a:r>
-          </a:p>
-          <a:p>
-            <a:r>
-              <a:rPr lang="de-CH" dirty="0"/>
-              <a:t>Was würden wir das nächste Mal anders machen?</a:t>
             </a:r>
           </a:p>
           <a:p>

</xml_diff>